<commit_message>
update the vuln presentation
</commit_message>
<xml_diff>
--- a/Vulns Presentation.pptx
+++ b/Vulns Presentation.pptx
@@ -5,15 +5,16 @@
     <p:sldMasterId id="2147483648" r:id="rId1"/>
   </p:sldMasterIdLst>
   <p:notesMasterIdLst>
-    <p:notesMasterId r:id="rId8"/>
+    <p:notesMasterId r:id="rId9"/>
   </p:notesMasterIdLst>
   <p:sldIdLst>
     <p:sldId id="256" r:id="rId2"/>
     <p:sldId id="260" r:id="rId3"/>
-    <p:sldId id="257" r:id="rId4"/>
-    <p:sldId id="261" r:id="rId5"/>
-    <p:sldId id="262" r:id="rId6"/>
-    <p:sldId id="263" r:id="rId7"/>
+    <p:sldId id="264" r:id="rId4"/>
+    <p:sldId id="257" r:id="rId5"/>
+    <p:sldId id="263" r:id="rId6"/>
+    <p:sldId id="261" r:id="rId7"/>
+    <p:sldId id="262" r:id="rId8"/>
   </p:sldIdLst>
   <p:sldSz cx="12192000" cy="6858000"/>
   <p:notesSz cx="6858000" cy="9144000"/>
@@ -202,7 +203,7 @@
           <a:p>
             <a:fld id="{8CED0CAF-48F0-B047-8B01-4261A129FCBF}" type="datetimeFigureOut">
               <a:rPr lang="en-US" smtClean="0"/>
-              <a:t>10/13/2016</a:t>
+              <a:t>10/14/2016</a:t>
             </a:fld>
             <a:endParaRPr lang="en-US"/>
           </a:p>
@@ -711,7 +712,7 @@
     </p:spTree>
     <p:extLst>
       <p:ext uri="{BB962C8B-B14F-4D97-AF65-F5344CB8AC3E}">
-        <p14:creationId xmlns:p14="http://schemas.microsoft.com/office/powerpoint/2010/main" val="2007191426"/>
+        <p14:creationId xmlns:p14="http://schemas.microsoft.com/office/powerpoint/2010/main" val="2820607089"/>
       </p:ext>
     </p:extLst>
   </p:cSld>
@@ -795,7 +796,7 @@
     </p:spTree>
     <p:extLst>
       <p:ext uri="{BB962C8B-B14F-4D97-AF65-F5344CB8AC3E}">
-        <p14:creationId xmlns:p14="http://schemas.microsoft.com/office/powerpoint/2010/main" val="899308993"/>
+        <p14:creationId xmlns:p14="http://schemas.microsoft.com/office/powerpoint/2010/main" val="2007191426"/>
       </p:ext>
     </p:extLst>
   </p:cSld>
@@ -879,7 +880,7 @@
     </p:spTree>
     <p:extLst>
       <p:ext uri="{BB962C8B-B14F-4D97-AF65-F5344CB8AC3E}">
-        <p14:creationId xmlns:p14="http://schemas.microsoft.com/office/powerpoint/2010/main" val="3255561216"/>
+        <p14:creationId xmlns:p14="http://schemas.microsoft.com/office/powerpoint/2010/main" val="569723063"/>
       </p:ext>
     </p:extLst>
   </p:cSld>
@@ -963,7 +964,91 @@
     </p:spTree>
     <p:extLst>
       <p:ext uri="{BB962C8B-B14F-4D97-AF65-F5344CB8AC3E}">
-        <p14:creationId xmlns:p14="http://schemas.microsoft.com/office/powerpoint/2010/main" val="569723063"/>
+        <p14:creationId xmlns:p14="http://schemas.microsoft.com/office/powerpoint/2010/main" val="899308993"/>
+      </p:ext>
+    </p:extLst>
+  </p:cSld>
+  <p:clrMapOvr>
+    <a:masterClrMapping/>
+  </p:clrMapOvr>
+</p:notes>
+</file>
+
+<file path=ppt/notesSlides/notesSlide7.xml><?xml version="1.0" encoding="utf-8"?>
+<p:notes xmlns:a="http://schemas.openxmlformats.org/drawingml/2006/main" xmlns:r="http://schemas.openxmlformats.org/officeDocument/2006/relationships" xmlns:p="http://schemas.openxmlformats.org/presentationml/2006/main">
+  <p:cSld>
+    <p:spTree>
+      <p:nvGrpSpPr>
+        <p:cNvPr id="1" name=""/>
+        <p:cNvGrpSpPr/>
+        <p:nvPr/>
+      </p:nvGrpSpPr>
+      <p:grpSpPr>
+        <a:xfrm>
+          <a:off x="0" y="0"/>
+          <a:ext cx="0" cy="0"/>
+          <a:chOff x="0" y="0"/>
+          <a:chExt cx="0" cy="0"/>
+        </a:xfrm>
+      </p:grpSpPr>
+      <p:sp>
+        <p:nvSpPr>
+          <p:cNvPr id="2" name="Slide Image Placeholder 1"/>
+          <p:cNvSpPr>
+            <a:spLocks noGrp="1" noRot="1" noChangeAspect="1"/>
+          </p:cNvSpPr>
+          <p:nvPr>
+            <p:ph type="sldImg"/>
+          </p:nvPr>
+        </p:nvSpPr>
+        <p:spPr/>
+      </p:sp>
+      <p:sp>
+        <p:nvSpPr>
+          <p:cNvPr id="3" name="Notes Placeholder 2"/>
+          <p:cNvSpPr>
+            <a:spLocks noGrp="1"/>
+          </p:cNvSpPr>
+          <p:nvPr>
+            <p:ph type="body" idx="1"/>
+          </p:nvPr>
+        </p:nvSpPr>
+        <p:spPr/>
+        <p:txBody>
+          <a:bodyPr/>
+          <a:lstStyle/>
+          <a:p>
+            <a:endParaRPr lang="en-GB" dirty="0"/>
+          </a:p>
+        </p:txBody>
+      </p:sp>
+      <p:sp>
+        <p:nvSpPr>
+          <p:cNvPr id="4" name="Slide Number Placeholder 3"/>
+          <p:cNvSpPr>
+            <a:spLocks noGrp="1"/>
+          </p:cNvSpPr>
+          <p:nvPr>
+            <p:ph type="sldNum" sz="quarter" idx="10"/>
+          </p:nvPr>
+        </p:nvSpPr>
+        <p:spPr/>
+        <p:txBody>
+          <a:bodyPr/>
+          <a:lstStyle/>
+          <a:p>
+            <a:fld id="{0EEE80A6-8C34-FD40-87D6-ABFF9C1C8DC5}" type="slidenum">
+              <a:rPr lang="en-US" smtClean="0"/>
+              <a:t>7</a:t>
+            </a:fld>
+            <a:endParaRPr lang="en-US"/>
+          </a:p>
+        </p:txBody>
+      </p:sp>
+    </p:spTree>
+    <p:extLst>
+      <p:ext uri="{BB962C8B-B14F-4D97-AF65-F5344CB8AC3E}">
+        <p14:creationId xmlns:p14="http://schemas.microsoft.com/office/powerpoint/2010/main" val="3255561216"/>
       </p:ext>
     </p:extLst>
   </p:cSld>
@@ -1102,7 +1187,7 @@
           <a:p>
             <a:fld id="{79BF2638-D68A-1A44-B9AD-7C21D58A6F6F}" type="datetimeFigureOut">
               <a:rPr lang="en-US" smtClean="0"/>
-              <a:t>10/13/2016</a:t>
+              <a:t>10/14/2016</a:t>
             </a:fld>
             <a:endParaRPr lang="en-US"/>
           </a:p>
@@ -1270,7 +1355,7 @@
           <a:p>
             <a:fld id="{79BF2638-D68A-1A44-B9AD-7C21D58A6F6F}" type="datetimeFigureOut">
               <a:rPr lang="en-US" smtClean="0"/>
-              <a:t>10/13/2016</a:t>
+              <a:t>10/14/2016</a:t>
             </a:fld>
             <a:endParaRPr lang="en-US"/>
           </a:p>
@@ -1448,7 +1533,7 @@
           <a:p>
             <a:fld id="{79BF2638-D68A-1A44-B9AD-7C21D58A6F6F}" type="datetimeFigureOut">
               <a:rPr lang="en-US" smtClean="0"/>
-              <a:t>10/13/2016</a:t>
+              <a:t>10/14/2016</a:t>
             </a:fld>
             <a:endParaRPr lang="en-US"/>
           </a:p>
@@ -1616,7 +1701,7 @@
           <a:p>
             <a:fld id="{79BF2638-D68A-1A44-B9AD-7C21D58A6F6F}" type="datetimeFigureOut">
               <a:rPr lang="en-US" smtClean="0"/>
-              <a:t>10/13/2016</a:t>
+              <a:t>10/14/2016</a:t>
             </a:fld>
             <a:endParaRPr lang="en-US"/>
           </a:p>
@@ -1861,7 +1946,7 @@
           <a:p>
             <a:fld id="{79BF2638-D68A-1A44-B9AD-7C21D58A6F6F}" type="datetimeFigureOut">
               <a:rPr lang="en-US" smtClean="0"/>
-              <a:t>10/13/2016</a:t>
+              <a:t>10/14/2016</a:t>
             </a:fld>
             <a:endParaRPr lang="en-US"/>
           </a:p>
@@ -2090,7 +2175,7 @@
           <a:p>
             <a:fld id="{79BF2638-D68A-1A44-B9AD-7C21D58A6F6F}" type="datetimeFigureOut">
               <a:rPr lang="en-US" smtClean="0"/>
-              <a:t>10/13/2016</a:t>
+              <a:t>10/14/2016</a:t>
             </a:fld>
             <a:endParaRPr lang="en-US"/>
           </a:p>
@@ -2454,7 +2539,7 @@
           <a:p>
             <a:fld id="{79BF2638-D68A-1A44-B9AD-7C21D58A6F6F}" type="datetimeFigureOut">
               <a:rPr lang="en-US" smtClean="0"/>
-              <a:t>10/13/2016</a:t>
+              <a:t>10/14/2016</a:t>
             </a:fld>
             <a:endParaRPr lang="en-US"/>
           </a:p>
@@ -2571,7 +2656,7 @@
           <a:p>
             <a:fld id="{79BF2638-D68A-1A44-B9AD-7C21D58A6F6F}" type="datetimeFigureOut">
               <a:rPr lang="en-US" smtClean="0"/>
-              <a:t>10/13/2016</a:t>
+              <a:t>10/14/2016</a:t>
             </a:fld>
             <a:endParaRPr lang="en-US"/>
           </a:p>
@@ -2666,7 +2751,7 @@
           <a:p>
             <a:fld id="{79BF2638-D68A-1A44-B9AD-7C21D58A6F6F}" type="datetimeFigureOut">
               <a:rPr lang="en-US" smtClean="0"/>
-              <a:t>10/13/2016</a:t>
+              <a:t>10/14/2016</a:t>
             </a:fld>
             <a:endParaRPr lang="en-US"/>
           </a:p>
@@ -2941,7 +3026,7 @@
           <a:p>
             <a:fld id="{79BF2638-D68A-1A44-B9AD-7C21D58A6F6F}" type="datetimeFigureOut">
               <a:rPr lang="en-US" smtClean="0"/>
-              <a:t>10/13/2016</a:t>
+              <a:t>10/14/2016</a:t>
             </a:fld>
             <a:endParaRPr lang="en-US"/>
           </a:p>
@@ -3193,7 +3278,7 @@
           <a:p>
             <a:fld id="{79BF2638-D68A-1A44-B9AD-7C21D58A6F6F}" type="datetimeFigureOut">
               <a:rPr lang="en-US" smtClean="0"/>
-              <a:t>10/13/2016</a:t>
+              <a:t>10/14/2016</a:t>
             </a:fld>
             <a:endParaRPr lang="en-US"/>
           </a:p>
@@ -3404,7 +3489,7 @@
           <a:p>
             <a:fld id="{79BF2638-D68A-1A44-B9AD-7C21D58A6F6F}" type="datetimeFigureOut">
               <a:rPr lang="en-US" smtClean="0"/>
-              <a:t>10/13/2016</a:t>
+              <a:t>10/14/2016</a:t>
             </a:fld>
             <a:endParaRPr lang="en-US"/>
           </a:p>
@@ -4139,7 +4224,7 @@
             <a:pPr algn="ctr"/>
             <a:r>
               <a:rPr lang="en-GB" dirty="0"/>
-              <a:t>CVE-2008-2370 – Apache Tomcat</a:t>
+              <a:t>ATTACK PLAN</a:t>
             </a:r>
             <a:endParaRPr lang="en-US" dirty="0"/>
           </a:p>
@@ -4157,119 +4242,121 @@
         </p:nvSpPr>
         <p:spPr>
           <a:xfrm>
-            <a:off x="838200" y="1825625"/>
-            <a:ext cx="5620657" cy="4351338"/>
+            <a:off x="838200" y="1257300"/>
+            <a:ext cx="10515600" cy="4919663"/>
           </a:xfrm>
         </p:spPr>
         <p:txBody>
           <a:bodyPr>
-            <a:normAutofit lnSpcReduction="10000"/>
+            <a:normAutofit/>
           </a:bodyPr>
           <a:lstStyle/>
           <a:p>
             <a:pPr algn="just"/>
             <a:r>
-              <a:rPr lang="en-US" sz="2200" dirty="0"/>
-              <a:t>Incorrectly timed path normalization might allow attackers to read arbitrary files via path traversal, by purposefully constructing the request parameter.</a:t>
-            </a:r>
+              <a:rPr lang="en-US" sz="2400" dirty="0"/>
+              <a:t>Apache Tomcat</a:t>
+            </a:r>
+          </a:p>
+          <a:p>
+            <a:pPr lvl="1" algn="just"/>
+            <a:r>
+              <a:rPr lang="en-GB" sz="2000" dirty="0"/>
+              <a:t>CVE-2011-0013 – Inject a script in the manager interface to obtain the manager’s session cookie.</a:t>
+            </a:r>
+          </a:p>
+          <a:p>
+            <a:pPr lvl="1" algn="just"/>
+            <a:r>
+              <a:rPr lang="en-US" sz="2000" dirty="0"/>
+              <a:t>Try to link the </a:t>
+            </a:r>
+            <a:r>
+              <a:rPr lang="en-US" sz="2000" dirty="0" err="1"/>
+              <a:t>ekit</a:t>
+            </a:r>
+            <a:r>
+              <a:rPr lang="en-US" sz="2000" dirty="0"/>
+              <a:t> with the available manager session. If not successful:</a:t>
+            </a:r>
+            <a:endParaRPr lang="en-GB" sz="2000" dirty="0"/>
+          </a:p>
+          <a:p>
+            <a:pPr lvl="1" algn="just"/>
+            <a:r>
+              <a:rPr lang="en-US" sz="2000" dirty="0"/>
+              <a:t>CVE-2016-1240 – Escalate the obtained user to root privileges.</a:t>
+            </a:r>
+          </a:p>
+          <a:p>
+            <a:pPr lvl="1" algn="just"/>
+            <a:r>
+              <a:rPr lang="en-US" sz="2000" dirty="0"/>
+              <a:t>Use the acquired root privileges to redirect the victim to the </a:t>
+            </a:r>
+            <a:r>
+              <a:rPr lang="en-US" sz="2000" dirty="0" err="1"/>
+              <a:t>ekit</a:t>
+            </a:r>
+            <a:r>
+              <a:rPr lang="en-US" sz="2000" dirty="0"/>
+              <a:t>.</a:t>
+            </a:r>
+            <a:endParaRPr lang="en-GB" sz="2000" dirty="0"/>
           </a:p>
           <a:p>
             <a:pPr algn="just"/>
             <a:r>
-              <a:rPr lang="en-US" sz="2200" dirty="0"/>
-              <a:t>4.1.0 &lt; 4.1.37 | 5.5.0 &lt; 5.5.26 | 6.0.0 &lt; 6.0.16</a:t>
-            </a:r>
+              <a:rPr lang="en-US" sz="2400" dirty="0"/>
+              <a:t>Spring</a:t>
+            </a:r>
+          </a:p>
+          <a:p>
+            <a:pPr lvl="1" algn="just"/>
+            <a:r>
+              <a:rPr lang="en-GB" sz="2000" dirty="0"/>
+              <a:t>CVE-2014-1904 - </a:t>
+            </a:r>
+            <a:endParaRPr lang="en-US" sz="2000" dirty="0"/>
           </a:p>
           <a:p>
             <a:pPr algn="just"/>
             <a:r>
-              <a:rPr lang="en-US" sz="2200" dirty="0"/>
-              <a:t>The attacker might read, modify, or remove any file in the server’s filesystem, even if such file is protected by security constraints or a WEB-INF.</a:t>
-            </a:r>
-          </a:p>
-          <a:p>
-            <a:pPr algn="just"/>
-            <a:r>
-              <a:rPr lang="en-US" sz="2200" dirty="0"/>
-              <a:t>The attacker might use a .. (dot dot) in one of the parameters of the query string to trick the dispatcher into serving a file residing in a protected folder.</a:t>
-            </a:r>
-            <a:endParaRPr lang="en-US" sz="2400" dirty="0"/>
-          </a:p>
-        </p:txBody>
-      </p:sp>
-      <p:sp>
-        <p:nvSpPr>
-          <p:cNvPr id="5" name="Title 1"/>
-          <p:cNvSpPr txBox="1">
-            <a:spLocks/>
-          </p:cNvSpPr>
-          <p:nvPr/>
-        </p:nvSpPr>
-        <p:spPr>
-          <a:xfrm>
-            <a:off x="838200" y="979148"/>
-            <a:ext cx="10515600" cy="711540"/>
-          </a:xfrm>
-          <a:prstGeom prst="rect">
-            <a:avLst/>
-          </a:prstGeom>
-        </p:spPr>
-        <p:txBody>
-          <a:bodyPr vert="horz" lIns="91440" tIns="45720" rIns="91440" bIns="45720" rtlCol="0" anchor="ctr">
-            <a:normAutofit fontScale="97500"/>
-          </a:bodyPr>
-          <a:lstStyle>
-            <a:lvl1pPr algn="l" defTabSz="914400" rtl="0" eaLnBrk="1" latinLnBrk="0" hangingPunct="1">
-              <a:lnSpc>
-                <a:spcPct val="90000"/>
-              </a:lnSpc>
-              <a:spcBef>
-                <a:spcPct val="0"/>
-              </a:spcBef>
-              <a:buNone/>
-              <a:defRPr sz="4400" kern="1200">
-                <a:solidFill>
-                  <a:schemeClr val="tx1"/>
-                </a:solidFill>
-                <a:latin typeface="+mj-lt"/>
-                <a:ea typeface="+mj-ea"/>
-                <a:cs typeface="+mj-cs"/>
-              </a:defRPr>
-            </a:lvl1pPr>
-          </a:lstStyle>
-          <a:p>
-            <a:pPr algn="ctr"/>
-            <a:r>
               <a:rPr lang="en-US" sz="2400" dirty="0"/>
-              <a:t>INFORMATION DISCLOSURE (PATH TRASVERSAL)</a:t>
-            </a:r>
-          </a:p>
-        </p:txBody>
-      </p:sp>
-      <p:pic>
-        <p:nvPicPr>
-          <p:cNvPr id="6" name="Picture 5"/>
-          <p:cNvPicPr>
-            <a:picLocks noChangeAspect="1"/>
-          </p:cNvPicPr>
-          <p:nvPr/>
-        </p:nvPicPr>
-        <p:blipFill>
-          <a:blip r:embed="rId3"/>
-          <a:stretch>
-            <a:fillRect/>
-          </a:stretch>
-        </p:blipFill>
-        <p:spPr>
-          <a:xfrm>
-            <a:off x="6694714" y="1825625"/>
-            <a:ext cx="5236029" cy="3573689"/>
-          </a:xfrm>
-          <a:prstGeom prst="rect">
-            <a:avLst/>
-          </a:prstGeom>
-        </p:spPr>
-      </p:pic>
+              <a:t>Jenkins</a:t>
+            </a:r>
+          </a:p>
+          <a:p>
+            <a:pPr lvl="1" algn="just"/>
+            <a:r>
+              <a:rPr lang="en-GB" sz="2000" dirty="0"/>
+              <a:t>CVE-2014-2064 – Obtain a list of existing users.</a:t>
+            </a:r>
+          </a:p>
+          <a:p>
+            <a:pPr lvl="1" algn="just"/>
+            <a:r>
+              <a:rPr lang="en-US" sz="2000" dirty="0"/>
+              <a:t>Brute force attack to guess the password of one of the users.</a:t>
+            </a:r>
+          </a:p>
+          <a:p>
+            <a:pPr lvl="1" algn="just"/>
+            <a:r>
+              <a:rPr lang="en-US" sz="2000" dirty="0"/>
+              <a:t>Link to the </a:t>
+            </a:r>
+            <a:r>
+              <a:rPr lang="en-US" sz="2000" dirty="0" err="1"/>
+              <a:t>ekit</a:t>
+            </a:r>
+            <a:r>
+              <a:rPr lang="en-US" sz="2000" dirty="0"/>
+              <a:t>.</a:t>
+            </a:r>
+          </a:p>
+        </p:txBody>
+      </p:sp>
     </p:spTree>
     <p:extLst>
       <p:ext uri="{BB962C8B-B14F-4D97-AF65-F5344CB8AC3E}">
@@ -4325,6 +4412,192 @@
             <a:pPr algn="ctr"/>
             <a:r>
               <a:rPr lang="en-GB" dirty="0"/>
+              <a:t>CVE-2008-2370 – Apache Tomcat</a:t>
+            </a:r>
+            <a:endParaRPr lang="en-US" dirty="0"/>
+          </a:p>
+        </p:txBody>
+      </p:sp>
+      <p:sp>
+        <p:nvSpPr>
+          <p:cNvPr id="3" name="Content Placeholder 2"/>
+          <p:cNvSpPr>
+            <a:spLocks noGrp="1"/>
+          </p:cNvSpPr>
+          <p:nvPr>
+            <p:ph idx="1"/>
+          </p:nvPr>
+        </p:nvSpPr>
+        <p:spPr>
+          <a:xfrm>
+            <a:off x="838200" y="1825625"/>
+            <a:ext cx="5620657" cy="4351338"/>
+          </a:xfrm>
+        </p:spPr>
+        <p:txBody>
+          <a:bodyPr>
+            <a:normAutofit lnSpcReduction="10000"/>
+          </a:bodyPr>
+          <a:lstStyle/>
+          <a:p>
+            <a:pPr algn="just"/>
+            <a:r>
+              <a:rPr lang="en-US" sz="2200" dirty="0"/>
+              <a:t>Incorrectly timed path normalization might allow attackers to read arbitrary files via path traversal, by purposefully constructing the request parameter.</a:t>
+            </a:r>
+          </a:p>
+          <a:p>
+            <a:pPr algn="just"/>
+            <a:r>
+              <a:rPr lang="en-US" sz="2200" dirty="0"/>
+              <a:t>4.1.0 &lt; 4.1.37 | 5.5.0 &lt; 5.5.26 | 6.0.0 &lt; 6.0.16</a:t>
+            </a:r>
+          </a:p>
+          <a:p>
+            <a:pPr algn="just"/>
+            <a:r>
+              <a:rPr lang="en-US" sz="2200" dirty="0"/>
+              <a:t>The attacker might read any file in the server’s filesystem, even if such file is protected by security constraints or a WEB-INF.</a:t>
+            </a:r>
+          </a:p>
+          <a:p>
+            <a:pPr algn="just"/>
+            <a:r>
+              <a:rPr lang="en-US" sz="2200" dirty="0"/>
+              <a:t>The attacker might use a /../ in one of the parameters of the query string to trick the dispatcher into serving a file residing in a protected folder.</a:t>
+            </a:r>
+            <a:endParaRPr lang="en-US" sz="2400" dirty="0"/>
+          </a:p>
+        </p:txBody>
+      </p:sp>
+      <p:sp>
+        <p:nvSpPr>
+          <p:cNvPr id="5" name="Title 1"/>
+          <p:cNvSpPr txBox="1">
+            <a:spLocks/>
+          </p:cNvSpPr>
+          <p:nvPr/>
+        </p:nvSpPr>
+        <p:spPr>
+          <a:xfrm>
+            <a:off x="838200" y="979148"/>
+            <a:ext cx="10515600" cy="711540"/>
+          </a:xfrm>
+          <a:prstGeom prst="rect">
+            <a:avLst/>
+          </a:prstGeom>
+        </p:spPr>
+        <p:txBody>
+          <a:bodyPr vert="horz" lIns="91440" tIns="45720" rIns="91440" bIns="45720" rtlCol="0" anchor="ctr">
+            <a:normAutofit fontScale="97500"/>
+          </a:bodyPr>
+          <a:lstStyle>
+            <a:lvl1pPr algn="l" defTabSz="914400" rtl="0" eaLnBrk="1" latinLnBrk="0" hangingPunct="1">
+              <a:lnSpc>
+                <a:spcPct val="90000"/>
+              </a:lnSpc>
+              <a:spcBef>
+                <a:spcPct val="0"/>
+              </a:spcBef>
+              <a:buNone/>
+              <a:defRPr sz="4400" kern="1200">
+                <a:solidFill>
+                  <a:schemeClr val="tx1"/>
+                </a:solidFill>
+                <a:latin typeface="+mj-lt"/>
+                <a:ea typeface="+mj-ea"/>
+                <a:cs typeface="+mj-cs"/>
+              </a:defRPr>
+            </a:lvl1pPr>
+          </a:lstStyle>
+          <a:p>
+            <a:pPr algn="ctr"/>
+            <a:r>
+              <a:rPr lang="en-US" sz="2400" dirty="0"/>
+              <a:t>INFORMATION DISCLOSURE (PATH TRAVERSAL)</a:t>
+            </a:r>
+          </a:p>
+        </p:txBody>
+      </p:sp>
+      <p:pic>
+        <p:nvPicPr>
+          <p:cNvPr id="6" name="Picture 5"/>
+          <p:cNvPicPr>
+            <a:picLocks noChangeAspect="1"/>
+          </p:cNvPicPr>
+          <p:nvPr/>
+        </p:nvPicPr>
+        <p:blipFill>
+          <a:blip r:embed="rId3"/>
+          <a:stretch>
+            <a:fillRect/>
+          </a:stretch>
+        </p:blipFill>
+        <p:spPr>
+          <a:xfrm>
+            <a:off x="6694714" y="1956254"/>
+            <a:ext cx="5236029" cy="3573689"/>
+          </a:xfrm>
+          <a:prstGeom prst="rect">
+            <a:avLst/>
+          </a:prstGeom>
+        </p:spPr>
+      </p:pic>
+    </p:spTree>
+    <p:extLst>
+      <p:ext uri="{BB962C8B-B14F-4D97-AF65-F5344CB8AC3E}">
+        <p14:creationId xmlns:p14="http://schemas.microsoft.com/office/powerpoint/2010/main" val="531457029"/>
+      </p:ext>
+    </p:extLst>
+  </p:cSld>
+  <p:clrMapOvr>
+    <a:masterClrMapping/>
+  </p:clrMapOvr>
+</p:sld>
+</file>
+
+<file path=ppt/slides/slide4.xml><?xml version="1.0" encoding="utf-8"?>
+<p:sld xmlns:a="http://schemas.openxmlformats.org/drawingml/2006/main" xmlns:r="http://schemas.openxmlformats.org/officeDocument/2006/relationships" xmlns:p="http://schemas.openxmlformats.org/presentationml/2006/main">
+  <p:cSld>
+    <p:spTree>
+      <p:nvGrpSpPr>
+        <p:cNvPr id="1" name=""/>
+        <p:cNvGrpSpPr/>
+        <p:nvPr/>
+      </p:nvGrpSpPr>
+      <p:grpSpPr>
+        <a:xfrm>
+          <a:off x="0" y="0"/>
+          <a:ext cx="0" cy="0"/>
+          <a:chOff x="0" y="0"/>
+          <a:chExt cx="0" cy="0"/>
+        </a:xfrm>
+      </p:grpSpPr>
+      <p:sp>
+        <p:nvSpPr>
+          <p:cNvPr id="2" name="Title 1"/>
+          <p:cNvSpPr>
+            <a:spLocks noGrp="1"/>
+          </p:cNvSpPr>
+          <p:nvPr>
+            <p:ph type="title"/>
+          </p:nvPr>
+        </p:nvSpPr>
+        <p:spPr>
+          <a:xfrm>
+            <a:off x="838200" y="402545"/>
+            <a:ext cx="10515600" cy="576603"/>
+          </a:xfrm>
+        </p:spPr>
+        <p:txBody>
+          <a:bodyPr>
+            <a:normAutofit fontScale="90000"/>
+          </a:bodyPr>
+          <a:lstStyle/>
+          <a:p>
+            <a:pPr algn="ctr"/>
+            <a:r>
+              <a:rPr lang="en-GB" dirty="0"/>
               <a:t>CVE-2011-0013 – Apache Tomcat</a:t>
             </a:r>
             <a:endParaRPr lang="en-US" dirty="0"/>
@@ -4356,7 +4629,7 @@
             <a:pPr algn="just"/>
             <a:r>
               <a:rPr lang="en-US" sz="2200" dirty="0"/>
-              <a:t>Multiple XSS vulnerabilities in the HTML manager allow attackers to inject any additional HTML or web scripts into Manager pages.</a:t>
+              <a:t>Multiple XSS vulnerabilities in the HTML manager allow attackers to inject any additional HTML or web scripts into manager pages.</a:t>
             </a:r>
           </a:p>
           <a:p>
@@ -4370,7 +4643,7 @@
             <a:pPr algn="just"/>
             <a:r>
               <a:rPr lang="en-US" sz="2200" dirty="0"/>
-              <a:t>The attacker might inject fake HTML or malicious web scripts into Manager pages.</a:t>
+              <a:t>The attacker might inject fake HTML or malicious web scripts into manager pages.</a:t>
             </a:r>
           </a:p>
           <a:p>
@@ -4468,7 +4741,176 @@
 </p:sld>
 </file>
 
-<file path=ppt/slides/slide4.xml><?xml version="1.0" encoding="utf-8"?>
+<file path=ppt/slides/slide5.xml><?xml version="1.0" encoding="utf-8"?>
+<p:sld xmlns:a="http://schemas.openxmlformats.org/drawingml/2006/main" xmlns:r="http://schemas.openxmlformats.org/officeDocument/2006/relationships" xmlns:p="http://schemas.openxmlformats.org/presentationml/2006/main">
+  <p:cSld>
+    <p:spTree>
+      <p:nvGrpSpPr>
+        <p:cNvPr id="1" name=""/>
+        <p:cNvGrpSpPr/>
+        <p:nvPr/>
+      </p:nvGrpSpPr>
+      <p:grpSpPr>
+        <a:xfrm>
+          <a:off x="0" y="0"/>
+          <a:ext cx="0" cy="0"/>
+          <a:chOff x="0" y="0"/>
+          <a:chExt cx="0" cy="0"/>
+        </a:xfrm>
+      </p:grpSpPr>
+      <p:sp>
+        <p:nvSpPr>
+          <p:cNvPr id="2" name="Title 1"/>
+          <p:cNvSpPr>
+            <a:spLocks noGrp="1"/>
+          </p:cNvSpPr>
+          <p:nvPr>
+            <p:ph type="title"/>
+          </p:nvPr>
+        </p:nvSpPr>
+        <p:spPr>
+          <a:xfrm>
+            <a:off x="838200" y="402545"/>
+            <a:ext cx="10515600" cy="576603"/>
+          </a:xfrm>
+        </p:spPr>
+        <p:txBody>
+          <a:bodyPr>
+            <a:normAutofit fontScale="90000"/>
+          </a:bodyPr>
+          <a:lstStyle/>
+          <a:p>
+            <a:pPr algn="ctr"/>
+            <a:r>
+              <a:rPr lang="en-GB" dirty="0"/>
+              <a:t>CVE-2016-1240 – Apache Tomcat</a:t>
+            </a:r>
+            <a:endParaRPr lang="en-US" dirty="0"/>
+          </a:p>
+        </p:txBody>
+      </p:sp>
+      <p:sp>
+        <p:nvSpPr>
+          <p:cNvPr id="3" name="Content Placeholder 2"/>
+          <p:cNvSpPr>
+            <a:spLocks noGrp="1"/>
+          </p:cNvSpPr>
+          <p:nvPr>
+            <p:ph idx="1"/>
+          </p:nvPr>
+        </p:nvSpPr>
+        <p:spPr>
+          <a:xfrm>
+            <a:off x="838200" y="1825625"/>
+            <a:ext cx="5591629" cy="4351338"/>
+          </a:xfrm>
+        </p:spPr>
+        <p:txBody>
+          <a:bodyPr>
+            <a:normAutofit/>
+          </a:bodyPr>
+          <a:lstStyle/>
+          <a:p>
+            <a:pPr algn="just"/>
+            <a:r>
+              <a:rPr lang="en-US" sz="2200" dirty="0"/>
+              <a:t>Local Tomcat users may gain root privileges via a </a:t>
+            </a:r>
+            <a:r>
+              <a:rPr lang="en-US" sz="2200" dirty="0" err="1"/>
+              <a:t>symlink</a:t>
+            </a:r>
+            <a:r>
+              <a:rPr lang="en-US" sz="2200" dirty="0"/>
+              <a:t> attack on the Catalina log file.</a:t>
+            </a:r>
+          </a:p>
+          <a:p>
+            <a:pPr algn="just"/>
+            <a:r>
+              <a:rPr lang="en-US" sz="2200" dirty="0"/>
+              <a:t>&lt; 6.0.35-1 | &lt; 7.0.52-1  | &lt; 7.0.56-3 | &lt; 8.0.14-1 |  &lt; 8.0.32-1</a:t>
+            </a:r>
+          </a:p>
+          <a:p>
+            <a:pPr algn="just"/>
+            <a:r>
+              <a:rPr lang="en-US" sz="2200" dirty="0"/>
+              <a:t>The attacker might obtain root privileges on the server, provided he has normal user access.</a:t>
+            </a:r>
+          </a:p>
+          <a:p>
+            <a:pPr algn="just"/>
+            <a:r>
+              <a:rPr lang="en-US" sz="2200" dirty="0"/>
+              <a:t>The attacker might obtain a normal user credentials through other means, and escalate to root access using this vulnerability.</a:t>
+            </a:r>
+          </a:p>
+        </p:txBody>
+      </p:sp>
+      <p:sp>
+        <p:nvSpPr>
+          <p:cNvPr id="5" name="Title 1"/>
+          <p:cNvSpPr txBox="1">
+            <a:spLocks/>
+          </p:cNvSpPr>
+          <p:nvPr/>
+        </p:nvSpPr>
+        <p:spPr>
+          <a:xfrm>
+            <a:off x="838200" y="979148"/>
+            <a:ext cx="10515600" cy="711540"/>
+          </a:xfrm>
+          <a:prstGeom prst="rect">
+            <a:avLst/>
+          </a:prstGeom>
+        </p:spPr>
+        <p:txBody>
+          <a:bodyPr vert="horz" lIns="91440" tIns="45720" rIns="91440" bIns="45720" rtlCol="0" anchor="ctr">
+            <a:normAutofit fontScale="97500"/>
+          </a:bodyPr>
+          <a:lstStyle>
+            <a:lvl1pPr algn="l" defTabSz="914400" rtl="0" eaLnBrk="1" latinLnBrk="0" hangingPunct="1">
+              <a:lnSpc>
+                <a:spcPct val="90000"/>
+              </a:lnSpc>
+              <a:spcBef>
+                <a:spcPct val="0"/>
+              </a:spcBef>
+              <a:buNone/>
+              <a:defRPr sz="4400" kern="1200">
+                <a:solidFill>
+                  <a:schemeClr val="tx1"/>
+                </a:solidFill>
+                <a:latin typeface="+mj-lt"/>
+                <a:ea typeface="+mj-ea"/>
+                <a:cs typeface="+mj-cs"/>
+              </a:defRPr>
+            </a:lvl1pPr>
+          </a:lstStyle>
+          <a:p>
+            <a:pPr algn="ctr"/>
+            <a:r>
+              <a:rPr lang="en-US" sz="2400" dirty="0"/>
+              <a:t>PRIVILEGE ESCALATION</a:t>
+            </a:r>
+          </a:p>
+        </p:txBody>
+      </p:sp>
+    </p:spTree>
+    <p:extLst>
+      <p:ext uri="{BB962C8B-B14F-4D97-AF65-F5344CB8AC3E}">
+        <p14:creationId xmlns:p14="http://schemas.microsoft.com/office/powerpoint/2010/main" val="1913894042"/>
+      </p:ext>
+    </p:extLst>
+  </p:cSld>
+  <p:clrMapOvr>
+    <a:masterClrMapping/>
+  </p:clrMapOvr>
+</p:sld>
+</file>
+
+<file path=ppt/slides/slide6.xml><?xml version="1.0" encoding="utf-8"?>
 <p:sld xmlns:a="http://schemas.openxmlformats.org/drawingml/2006/main" xmlns:r="http://schemas.openxmlformats.org/officeDocument/2006/relationships" xmlns:p="http://schemas.openxmlformats.org/presentationml/2006/main">
   <p:cSld>
     <p:spTree>
@@ -4661,7 +5103,7 @@
 </p:sld>
 </file>
 
-<file path=ppt/slides/slide5.xml><?xml version="1.0" encoding="utf-8"?>
+<file path=ppt/slides/slide7.xml><?xml version="1.0" encoding="utf-8"?>
 <p:sld xmlns:a="http://schemas.openxmlformats.org/drawingml/2006/main" xmlns:r="http://schemas.openxmlformats.org/officeDocument/2006/relationships" xmlns:p="http://schemas.openxmlformats.org/presentationml/2006/main">
   <p:cSld>
     <p:spTree>
@@ -4734,8 +5176,13 @@
             <a:pPr algn="just"/>
             <a:r>
               <a:rPr lang="en-US" sz="2200" dirty="0"/>
-              <a:t>A function in the default security system allows attackers to list the existing usernames through brute-force attacks.</a:t>
-            </a:r>
+              <a:t>A function in the default security system allows attackers to list the existing usernames</a:t>
+            </a:r>
+            <a:r>
+              <a:rPr lang="en-GB" sz="2200" dirty="0"/>
+              <a:t>  via vectors related to failed login attempts.</a:t>
+            </a:r>
+            <a:endParaRPr lang="en-US" sz="2200" dirty="0"/>
           </a:p>
           <a:p>
             <a:pPr algn="just"/>
@@ -4837,175 +5284,6 @@
     <p:extLst>
       <p:ext uri="{BB962C8B-B14F-4D97-AF65-F5344CB8AC3E}">
         <p14:creationId xmlns:p14="http://schemas.microsoft.com/office/powerpoint/2010/main" val="2410278081"/>
-      </p:ext>
-    </p:extLst>
-  </p:cSld>
-  <p:clrMapOvr>
-    <a:masterClrMapping/>
-  </p:clrMapOvr>
-</p:sld>
-</file>
-
-<file path=ppt/slides/slide6.xml><?xml version="1.0" encoding="utf-8"?>
-<p:sld xmlns:a="http://schemas.openxmlformats.org/drawingml/2006/main" xmlns:r="http://schemas.openxmlformats.org/officeDocument/2006/relationships" xmlns:p="http://schemas.openxmlformats.org/presentationml/2006/main">
-  <p:cSld>
-    <p:spTree>
-      <p:nvGrpSpPr>
-        <p:cNvPr id="1" name=""/>
-        <p:cNvGrpSpPr/>
-        <p:nvPr/>
-      </p:nvGrpSpPr>
-      <p:grpSpPr>
-        <a:xfrm>
-          <a:off x="0" y="0"/>
-          <a:ext cx="0" cy="0"/>
-          <a:chOff x="0" y="0"/>
-          <a:chExt cx="0" cy="0"/>
-        </a:xfrm>
-      </p:grpSpPr>
-      <p:sp>
-        <p:nvSpPr>
-          <p:cNvPr id="2" name="Title 1"/>
-          <p:cNvSpPr>
-            <a:spLocks noGrp="1"/>
-          </p:cNvSpPr>
-          <p:nvPr>
-            <p:ph type="title"/>
-          </p:nvPr>
-        </p:nvSpPr>
-        <p:spPr>
-          <a:xfrm>
-            <a:off x="838200" y="402545"/>
-            <a:ext cx="10515600" cy="576603"/>
-          </a:xfrm>
-        </p:spPr>
-        <p:txBody>
-          <a:bodyPr>
-            <a:normAutofit fontScale="90000"/>
-          </a:bodyPr>
-          <a:lstStyle/>
-          <a:p>
-            <a:pPr algn="ctr"/>
-            <a:r>
-              <a:rPr lang="en-GB" dirty="0"/>
-              <a:t>CVE-2016-1240 – Apache Tomcat</a:t>
-            </a:r>
-            <a:endParaRPr lang="en-US" dirty="0"/>
-          </a:p>
-        </p:txBody>
-      </p:sp>
-      <p:sp>
-        <p:nvSpPr>
-          <p:cNvPr id="3" name="Content Placeholder 2"/>
-          <p:cNvSpPr>
-            <a:spLocks noGrp="1"/>
-          </p:cNvSpPr>
-          <p:nvPr>
-            <p:ph idx="1"/>
-          </p:nvPr>
-        </p:nvSpPr>
-        <p:spPr>
-          <a:xfrm>
-            <a:off x="838200" y="1825625"/>
-            <a:ext cx="5591629" cy="4351338"/>
-          </a:xfrm>
-        </p:spPr>
-        <p:txBody>
-          <a:bodyPr>
-            <a:normAutofit/>
-          </a:bodyPr>
-          <a:lstStyle/>
-          <a:p>
-            <a:pPr algn="just"/>
-            <a:r>
-              <a:rPr lang="en-US" sz="2200" dirty="0"/>
-              <a:t>Local users with access to Tomcat may gain root privileges via a </a:t>
-            </a:r>
-            <a:r>
-              <a:rPr lang="en-US" sz="2200" dirty="0" err="1"/>
-              <a:t>symlink</a:t>
-            </a:r>
-            <a:r>
-              <a:rPr lang="en-US" sz="2200" dirty="0"/>
-              <a:t> attack on the Catalina log file.</a:t>
-            </a:r>
-          </a:p>
-          <a:p>
-            <a:pPr algn="just"/>
-            <a:r>
-              <a:rPr lang="en-US" sz="2200" dirty="0"/>
-              <a:t>&lt; 7.0.56-3 | &lt; 8.0.14-1 | &lt; 6.0.35-1 | &lt; 7.0.52-1 | &lt; 8.0.32-1</a:t>
-            </a:r>
-          </a:p>
-          <a:p>
-            <a:pPr algn="just"/>
-            <a:r>
-              <a:rPr lang="en-US" sz="2200" dirty="0"/>
-              <a:t>The attacker might obtain root privileges on the server, provided he has normal user access.</a:t>
-            </a:r>
-          </a:p>
-          <a:p>
-            <a:pPr algn="just"/>
-            <a:r>
-              <a:rPr lang="en-US" sz="2200" dirty="0"/>
-              <a:t>The attacker might obtain a normal user credentials through other means, and escalate to root access using this vulnerability.</a:t>
-            </a:r>
-          </a:p>
-        </p:txBody>
-      </p:sp>
-      <p:sp>
-        <p:nvSpPr>
-          <p:cNvPr id="5" name="Title 1"/>
-          <p:cNvSpPr txBox="1">
-            <a:spLocks/>
-          </p:cNvSpPr>
-          <p:nvPr/>
-        </p:nvSpPr>
-        <p:spPr>
-          <a:xfrm>
-            <a:off x="838200" y="979148"/>
-            <a:ext cx="10515600" cy="711540"/>
-          </a:xfrm>
-          <a:prstGeom prst="rect">
-            <a:avLst/>
-          </a:prstGeom>
-        </p:spPr>
-        <p:txBody>
-          <a:bodyPr vert="horz" lIns="91440" tIns="45720" rIns="91440" bIns="45720" rtlCol="0" anchor="ctr">
-            <a:normAutofit fontScale="97500"/>
-          </a:bodyPr>
-          <a:lstStyle>
-            <a:lvl1pPr algn="l" defTabSz="914400" rtl="0" eaLnBrk="1" latinLnBrk="0" hangingPunct="1">
-              <a:lnSpc>
-                <a:spcPct val="90000"/>
-              </a:lnSpc>
-              <a:spcBef>
-                <a:spcPct val="0"/>
-              </a:spcBef>
-              <a:buNone/>
-              <a:defRPr sz="4400" kern="1200">
-                <a:solidFill>
-                  <a:schemeClr val="tx1"/>
-                </a:solidFill>
-                <a:latin typeface="+mj-lt"/>
-                <a:ea typeface="+mj-ea"/>
-                <a:cs typeface="+mj-cs"/>
-              </a:defRPr>
-            </a:lvl1pPr>
-          </a:lstStyle>
-          <a:p>
-            <a:pPr algn="ctr"/>
-            <a:r>
-              <a:rPr lang="en-US" sz="2400" dirty="0"/>
-              <a:t>PRIVILEGE ESCALATION</a:t>
-            </a:r>
-          </a:p>
-        </p:txBody>
-      </p:sp>
-    </p:spTree>
-    <p:extLst>
-      <p:ext uri="{BB962C8B-B14F-4D97-AF65-F5344CB8AC3E}">
-        <p14:creationId xmlns:p14="http://schemas.microsoft.com/office/powerpoint/2010/main" val="1913894042"/>
       </p:ext>
     </p:extLst>
   </p:cSld>

</xml_diff>